<commit_message>
Add Excel logo in Used Technologies slide
</commit_message>
<xml_diff>
--- a/Presentation, Documentations and Test cases/The_Infernos_Presentation.pptx
+++ b/Presentation, Documentations and Test cases/The_Infernos_Presentation.pptx
@@ -6538,7 +6538,7 @@
         </p:blipFill>
         <p:spPr bwMode="auto">
           <a:xfrm>
-            <a:off x="2630617" y="2492440"/>
+            <a:off x="2661786" y="2984121"/>
             <a:ext cx="1363152" cy="1363152"/>
           </a:xfrm>
           <a:prstGeom prst="rect">
@@ -6578,7 +6578,7 @@
         </p:blipFill>
         <p:spPr>
           <a:xfrm>
-            <a:off x="4785101" y="2984121"/>
+            <a:off x="6656323" y="2869901"/>
             <a:ext cx="1884231" cy="1884231"/>
           </a:xfrm>
           <a:prstGeom prst="rect">
@@ -6638,7 +6638,7 @@
         </p:blipFill>
         <p:spPr>
           <a:xfrm>
-            <a:off x="4300886" y="1522102"/>
+            <a:off x="5119063" y="2786391"/>
             <a:ext cx="1363152" cy="1363152"/>
           </a:xfrm>
           <a:prstGeom prst="rect">
@@ -6698,7 +6698,37 @@
         </p:blipFill>
         <p:spPr>
           <a:xfrm>
-            <a:off x="6278273" y="1890174"/>
+            <a:off x="6814538" y="1423239"/>
+            <a:ext cx="1465605" cy="1363152"/>
+          </a:xfrm>
+          <a:prstGeom prst="rect">
+            <a:avLst/>
+          </a:prstGeom>
+        </p:spPr>
+      </p:pic>
+      <p:pic>
+        <p:nvPicPr>
+          <p:cNvPr id="6" name="Picture 5" descr="Icon&#10;&#10;Description automatically generated">
+            <a:extLst>
+              <a:ext uri="{FF2B5EF4-FFF2-40B4-BE49-F238E27FC236}">
+                <a16:creationId xmlns:a16="http://schemas.microsoft.com/office/drawing/2014/main" id="{A17B7317-4F7B-4220-8592-3B1C2AD59405}"/>
+              </a:ext>
+            </a:extLst>
+          </p:cNvPr>
+          <p:cNvPicPr>
+            <a:picLocks noChangeAspect="1"/>
+          </p:cNvPicPr>
+          <p:nvPr/>
+        </p:nvPicPr>
+        <p:blipFill>
+          <a:blip r:embed="rId8"/>
+          <a:stretch>
+            <a:fillRect/>
+          </a:stretch>
+        </p:blipFill>
+        <p:spPr>
+          <a:xfrm>
+            <a:off x="3653458" y="1477803"/>
             <a:ext cx="1465605" cy="1363152"/>
           </a:xfrm>
           <a:prstGeom prst="rect">

</xml_diff>